<commit_message>
Update powerpoint and fix plot labeling
</commit_message>
<xml_diff>
--- a/Earthquake Presentation.pptx
+++ b/Earthquake Presentation.pptx
@@ -7,13 +7,16 @@
   <p:sldIdLst>
     <p:sldId id="256" r:id="rId2"/>
     <p:sldId id="258" r:id="rId3"/>
-    <p:sldId id="257" r:id="rId4"/>
-    <p:sldId id="261" r:id="rId5"/>
-    <p:sldId id="259" r:id="rId6"/>
-    <p:sldId id="264" r:id="rId7"/>
-    <p:sldId id="260" r:id="rId8"/>
-    <p:sldId id="262" r:id="rId9"/>
-    <p:sldId id="263" r:id="rId10"/>
+    <p:sldId id="266" r:id="rId4"/>
+    <p:sldId id="257" r:id="rId5"/>
+    <p:sldId id="267" r:id="rId6"/>
+    <p:sldId id="261" r:id="rId7"/>
+    <p:sldId id="259" r:id="rId8"/>
+    <p:sldId id="264" r:id="rId9"/>
+    <p:sldId id="260" r:id="rId10"/>
+    <p:sldId id="262" r:id="rId11"/>
+    <p:sldId id="263" r:id="rId12"/>
+    <p:sldId id="265" r:id="rId13"/>
   </p:sldIdLst>
   <p:sldSz cx="12192000" cy="6858000"/>
   <p:notesSz cx="6858000" cy="9144000"/>
@@ -112,6 +115,11 @@
       </a:defRPr>
     </a:lvl9pPr>
   </p:defaultTextStyle>
+  <p:extLst>
+    <p:ext uri="{EFAFB233-063F-42B5-8137-9DF3F51BA10A}">
+      <p15:sldGuideLst xmlns:p15="http://schemas.microsoft.com/office/powerpoint/2012/main"/>
+    </p:ext>
+  </p:extLst>
 </p:presentation>
 </file>
 
@@ -837,7 +845,7 @@
           <a:p>
             <a:fld id="{968651FB-3A31-47DC-940D-9D9C74EBAE1B}" type="datetimeFigureOut">
               <a:rPr lang="en-US" smtClean="0"/>
-              <a:t>5/6/2018</a:t>
+              <a:t>5/13/2018</a:t>
             </a:fld>
             <a:endParaRPr lang="en-US"/>
           </a:p>
@@ -1088,7 +1096,7 @@
           <a:p>
             <a:fld id="{968651FB-3A31-47DC-940D-9D9C74EBAE1B}" type="datetimeFigureOut">
               <a:rPr lang="en-US" smtClean="0"/>
-              <a:t>5/6/2018</a:t>
+              <a:t>5/13/2018</a:t>
             </a:fld>
             <a:endParaRPr lang="en-US"/>
           </a:p>
@@ -1402,7 +1410,7 @@
           <a:p>
             <a:fld id="{968651FB-3A31-47DC-940D-9D9C74EBAE1B}" type="datetimeFigureOut">
               <a:rPr lang="en-US" smtClean="0"/>
-              <a:t>5/6/2018</a:t>
+              <a:t>5/13/2018</a:t>
             </a:fld>
             <a:endParaRPr lang="en-US"/>
           </a:p>
@@ -1743,7 +1751,7 @@
           <a:p>
             <a:fld id="{968651FB-3A31-47DC-940D-9D9C74EBAE1B}" type="datetimeFigureOut">
               <a:rPr lang="en-US" smtClean="0"/>
-              <a:t>5/6/2018</a:t>
+              <a:t>5/13/2018</a:t>
             </a:fld>
             <a:endParaRPr lang="en-US"/>
           </a:p>
@@ -2057,7 +2065,7 @@
           <a:p>
             <a:fld id="{968651FB-3A31-47DC-940D-9D9C74EBAE1B}" type="datetimeFigureOut">
               <a:rPr lang="en-US" smtClean="0"/>
-              <a:t>5/6/2018</a:t>
+              <a:t>5/13/2018</a:t>
             </a:fld>
             <a:endParaRPr lang="en-US"/>
           </a:p>
@@ -2450,7 +2458,7 @@
           <a:p>
             <a:fld id="{968651FB-3A31-47DC-940D-9D9C74EBAE1B}" type="datetimeFigureOut">
               <a:rPr lang="en-US" smtClean="0"/>
-              <a:t>5/6/2018</a:t>
+              <a:t>5/13/2018</a:t>
             </a:fld>
             <a:endParaRPr lang="en-US"/>
           </a:p>
@@ -2620,7 +2628,7 @@
           <a:p>
             <a:fld id="{968651FB-3A31-47DC-940D-9D9C74EBAE1B}" type="datetimeFigureOut">
               <a:rPr lang="en-US" smtClean="0"/>
-              <a:t>5/6/2018</a:t>
+              <a:t>5/13/2018</a:t>
             </a:fld>
             <a:endParaRPr lang="en-US"/>
           </a:p>
@@ -2800,7 +2808,7 @@
           <a:p>
             <a:fld id="{968651FB-3A31-47DC-940D-9D9C74EBAE1B}" type="datetimeFigureOut">
               <a:rPr lang="en-US" smtClean="0"/>
-              <a:t>5/6/2018</a:t>
+              <a:t>5/13/2018</a:t>
             </a:fld>
             <a:endParaRPr lang="en-US"/>
           </a:p>
@@ -2976,7 +2984,7 @@
           <a:p>
             <a:fld id="{968651FB-3A31-47DC-940D-9D9C74EBAE1B}" type="datetimeFigureOut">
               <a:rPr lang="en-US" smtClean="0"/>
-              <a:t>5/6/2018</a:t>
+              <a:t>5/13/2018</a:t>
             </a:fld>
             <a:endParaRPr lang="en-US"/>
           </a:p>
@@ -3223,7 +3231,7 @@
           <a:p>
             <a:fld id="{968651FB-3A31-47DC-940D-9D9C74EBAE1B}" type="datetimeFigureOut">
               <a:rPr lang="en-US" smtClean="0"/>
-              <a:t>5/6/2018</a:t>
+              <a:t>5/13/2018</a:t>
             </a:fld>
             <a:endParaRPr lang="en-US"/>
           </a:p>
@@ -3455,7 +3463,7 @@
           <a:p>
             <a:fld id="{968651FB-3A31-47DC-940D-9D9C74EBAE1B}" type="datetimeFigureOut">
               <a:rPr lang="en-US" smtClean="0"/>
-              <a:t>5/6/2018</a:t>
+              <a:t>5/13/2018</a:t>
             </a:fld>
             <a:endParaRPr lang="en-US"/>
           </a:p>
@@ -3829,7 +3837,7 @@
           <a:p>
             <a:fld id="{968651FB-3A31-47DC-940D-9D9C74EBAE1B}" type="datetimeFigureOut">
               <a:rPr lang="en-US" smtClean="0"/>
-              <a:t>5/6/2018</a:t>
+              <a:t>5/13/2018</a:t>
             </a:fld>
             <a:endParaRPr lang="en-US"/>
           </a:p>
@@ -3952,7 +3960,7 @@
           <a:p>
             <a:fld id="{968651FB-3A31-47DC-940D-9D9C74EBAE1B}" type="datetimeFigureOut">
               <a:rPr lang="en-US" smtClean="0"/>
-              <a:t>5/6/2018</a:t>
+              <a:t>5/13/2018</a:t>
             </a:fld>
             <a:endParaRPr lang="en-US"/>
           </a:p>
@@ -4047,7 +4055,7 @@
           <a:p>
             <a:fld id="{968651FB-3A31-47DC-940D-9D9C74EBAE1B}" type="datetimeFigureOut">
               <a:rPr lang="en-US" smtClean="0"/>
-              <a:t>5/6/2018</a:t>
+              <a:t>5/13/2018</a:t>
             </a:fld>
             <a:endParaRPr lang="en-US"/>
           </a:p>
@@ -4302,7 +4310,7 @@
           <a:p>
             <a:fld id="{968651FB-3A31-47DC-940D-9D9C74EBAE1B}" type="datetimeFigureOut">
               <a:rPr lang="en-US" smtClean="0"/>
-              <a:t>5/6/2018</a:t>
+              <a:t>5/13/2018</a:t>
             </a:fld>
             <a:endParaRPr lang="en-US"/>
           </a:p>
@@ -4565,7 +4573,7 @@
           <a:p>
             <a:fld id="{968651FB-3A31-47DC-940D-9D9C74EBAE1B}" type="datetimeFigureOut">
               <a:rPr lang="en-US" smtClean="0"/>
-              <a:t>5/6/2018</a:t>
+              <a:t>5/13/2018</a:t>
             </a:fld>
             <a:endParaRPr lang="en-US"/>
           </a:p>
@@ -5308,7 +5316,7 @@
           <a:p>
             <a:fld id="{968651FB-3A31-47DC-940D-9D9C74EBAE1B}" type="datetimeFigureOut">
               <a:rPr lang="en-US" smtClean="0"/>
-              <a:t>5/6/2018</a:t>
+              <a:t>5/13/2018</a:t>
             </a:fld>
             <a:endParaRPr lang="en-US"/>
           </a:p>
@@ -5903,6 +5911,486 @@
 </p:sld>
 </file>
 
+<file path=ppt/slides/slide10.xml><?xml version="1.0" encoding="utf-8"?>
+<p:sld xmlns:a="http://schemas.openxmlformats.org/drawingml/2006/main" xmlns:r="http://schemas.openxmlformats.org/officeDocument/2006/relationships" xmlns:p="http://schemas.openxmlformats.org/presentationml/2006/main">
+  <p:cSld>
+    <p:spTree>
+      <p:nvGrpSpPr>
+        <p:cNvPr id="1" name=""/>
+        <p:cNvGrpSpPr/>
+        <p:nvPr/>
+      </p:nvGrpSpPr>
+      <p:grpSpPr>
+        <a:xfrm>
+          <a:off x="0" y="0"/>
+          <a:ext cx="0" cy="0"/>
+          <a:chOff x="0" y="0"/>
+          <a:chExt cx="0" cy="0"/>
+        </a:xfrm>
+      </p:grpSpPr>
+      <p:sp>
+        <p:nvSpPr>
+          <p:cNvPr id="2" name="Title 1">
+            <a:extLst>
+              <a:ext uri="{FF2B5EF4-FFF2-40B4-BE49-F238E27FC236}">
+                <a16:creationId xmlns:a16="http://schemas.microsoft.com/office/drawing/2014/main" id="{320157D6-52E0-453F-8846-DFDDC0FFA4BF}"/>
+              </a:ext>
+            </a:extLst>
+          </p:cNvPr>
+          <p:cNvSpPr>
+            <a:spLocks noGrp="1"/>
+          </p:cNvSpPr>
+          <p:nvPr>
+            <p:ph type="title"/>
+          </p:nvPr>
+        </p:nvSpPr>
+        <p:spPr/>
+        <p:txBody>
+          <a:bodyPr/>
+          <a:lstStyle/>
+          <a:p>
+            <a:r>
+              <a:rPr lang="en-US" dirty="0"/>
+              <a:t>Varied Masses</a:t>
+            </a:r>
+          </a:p>
+        </p:txBody>
+      </p:sp>
+      <p:sp>
+        <p:nvSpPr>
+          <p:cNvPr id="4" name="Content Placeholder 3">
+            <a:extLst>
+              <a:ext uri="{FF2B5EF4-FFF2-40B4-BE49-F238E27FC236}">
+                <a16:creationId xmlns:a16="http://schemas.microsoft.com/office/drawing/2014/main" id="{CEB05CFB-5D9D-4BDE-A584-886F4070A179}"/>
+              </a:ext>
+            </a:extLst>
+          </p:cNvPr>
+          <p:cNvSpPr>
+            <a:spLocks noGrp="1"/>
+          </p:cNvSpPr>
+          <p:nvPr>
+            <p:ph idx="1"/>
+          </p:nvPr>
+        </p:nvSpPr>
+        <p:spPr>
+          <a:xfrm>
+            <a:off x="677334" y="1270000"/>
+            <a:ext cx="8596668" cy="3880773"/>
+          </a:xfrm>
+        </p:spPr>
+        <p:txBody>
+          <a:bodyPr/>
+          <a:lstStyle/>
+          <a:p>
+            <a:r>
+              <a:rPr lang="en-US" dirty="0"/>
+              <a:t>Varied masses from 0.5 to 2</a:t>
+            </a:r>
+          </a:p>
+          <a:p>
+            <a:r>
+              <a:rPr lang="en-US" dirty="0"/>
+              <a:t>Excess of large earthquakes</a:t>
+            </a:r>
+          </a:p>
+          <a:p>
+            <a:r>
+              <a:rPr lang="en-US" dirty="0"/>
+              <a:t>b = 0.632</a:t>
+            </a:r>
+          </a:p>
+        </p:txBody>
+      </p:sp>
+      <p:pic>
+        <p:nvPicPr>
+          <p:cNvPr id="6" name="Picture 5">
+            <a:extLst>
+              <a:ext uri="{FF2B5EF4-FFF2-40B4-BE49-F238E27FC236}">
+                <a16:creationId xmlns:a16="http://schemas.microsoft.com/office/drawing/2014/main" id="{5D47D276-96B7-4D71-B28A-3933C7A6AC07}"/>
+              </a:ext>
+            </a:extLst>
+          </p:cNvPr>
+          <p:cNvPicPr>
+            <a:picLocks noChangeAspect="1"/>
+          </p:cNvPicPr>
+          <p:nvPr/>
+        </p:nvPicPr>
+        <p:blipFill>
+          <a:blip r:embed="rId2"/>
+          <a:stretch>
+            <a:fillRect/>
+          </a:stretch>
+        </p:blipFill>
+        <p:spPr>
+          <a:xfrm>
+            <a:off x="478663" y="2590800"/>
+            <a:ext cx="10501281" cy="3880772"/>
+          </a:xfrm>
+          <a:prstGeom prst="rect">
+            <a:avLst/>
+          </a:prstGeom>
+        </p:spPr>
+        <p:style>
+          <a:lnRef idx="2">
+            <a:schemeClr val="accent1"/>
+          </a:lnRef>
+          <a:fillRef idx="1">
+            <a:schemeClr val="lt1"/>
+          </a:fillRef>
+          <a:effectRef idx="0">
+            <a:schemeClr val="accent1"/>
+          </a:effectRef>
+          <a:fontRef idx="minor">
+            <a:schemeClr val="dk1"/>
+          </a:fontRef>
+        </p:style>
+      </p:pic>
+    </p:spTree>
+    <p:extLst>
+      <p:ext uri="{BB962C8B-B14F-4D97-AF65-F5344CB8AC3E}">
+        <p14:creationId xmlns:p14="http://schemas.microsoft.com/office/powerpoint/2010/main" val="3891700054"/>
+      </p:ext>
+    </p:extLst>
+  </p:cSld>
+  <p:clrMapOvr>
+    <a:masterClrMapping/>
+  </p:clrMapOvr>
+</p:sld>
+</file>
+
+<file path=ppt/slides/slide11.xml><?xml version="1.0" encoding="utf-8"?>
+<p:sld xmlns:a="http://schemas.openxmlformats.org/drawingml/2006/main" xmlns:r="http://schemas.openxmlformats.org/officeDocument/2006/relationships" xmlns:p="http://schemas.openxmlformats.org/presentationml/2006/main">
+  <p:cSld>
+    <p:spTree>
+      <p:nvGrpSpPr>
+        <p:cNvPr id="1" name=""/>
+        <p:cNvGrpSpPr/>
+        <p:nvPr/>
+      </p:nvGrpSpPr>
+      <p:grpSpPr>
+        <a:xfrm>
+          <a:off x="0" y="0"/>
+          <a:ext cx="0" cy="0"/>
+          <a:chOff x="0" y="0"/>
+          <a:chExt cx="0" cy="0"/>
+        </a:xfrm>
+      </p:grpSpPr>
+      <p:sp>
+        <p:nvSpPr>
+          <p:cNvPr id="2" name="Title 1">
+            <a:extLst>
+              <a:ext uri="{FF2B5EF4-FFF2-40B4-BE49-F238E27FC236}">
+                <a16:creationId xmlns:a16="http://schemas.microsoft.com/office/drawing/2014/main" id="{505E8BDB-C898-4063-ABAD-B5DAD6A00DE7}"/>
+              </a:ext>
+            </a:extLst>
+          </p:cNvPr>
+          <p:cNvSpPr>
+            <a:spLocks noGrp="1"/>
+          </p:cNvSpPr>
+          <p:nvPr>
+            <p:ph type="title"/>
+          </p:nvPr>
+        </p:nvSpPr>
+        <p:spPr/>
+        <p:txBody>
+          <a:bodyPr/>
+          <a:lstStyle/>
+          <a:p>
+            <a:r>
+              <a:rPr lang="en-US" dirty="0"/>
+              <a:t>Conclusion</a:t>
+            </a:r>
+          </a:p>
+        </p:txBody>
+      </p:sp>
+      <p:sp>
+        <p:nvSpPr>
+          <p:cNvPr id="3" name="Content Placeholder 2">
+            <a:extLst>
+              <a:ext uri="{FF2B5EF4-FFF2-40B4-BE49-F238E27FC236}">
+                <a16:creationId xmlns:a16="http://schemas.microsoft.com/office/drawing/2014/main" id="{C4709CF8-0D5D-4626-9097-95BD4675B51D}"/>
+              </a:ext>
+            </a:extLst>
+          </p:cNvPr>
+          <p:cNvSpPr>
+            <a:spLocks noGrp="1"/>
+          </p:cNvSpPr>
+          <p:nvPr>
+            <p:ph idx="1"/>
+          </p:nvPr>
+        </p:nvSpPr>
+        <p:spPr/>
+        <p:txBody>
+          <a:bodyPr/>
+          <a:lstStyle/>
+          <a:p>
+            <a:r>
+              <a:rPr lang="en-US" dirty="0"/>
+              <a:t>Model produced accurate statistics for small magnitudes, but not large ones </a:t>
+            </a:r>
+          </a:p>
+          <a:p>
+            <a:r>
+              <a:rPr lang="en-US" dirty="0"/>
+              <a:t>Varying masses did not make a large difference</a:t>
+            </a:r>
+          </a:p>
+          <a:p>
+            <a:r>
+              <a:rPr lang="en-US" dirty="0"/>
+              <a:t>The earthquake patterns over a small time period are consistent with real earthquakes</a:t>
+            </a:r>
+          </a:p>
+          <a:p>
+            <a:pPr lvl="1"/>
+            <a:r>
+              <a:rPr lang="en-US" dirty="0"/>
+              <a:t>May help us predict when earthquakes will occur</a:t>
+            </a:r>
+          </a:p>
+        </p:txBody>
+      </p:sp>
+    </p:spTree>
+    <p:extLst>
+      <p:ext uri="{BB962C8B-B14F-4D97-AF65-F5344CB8AC3E}">
+        <p14:creationId xmlns:p14="http://schemas.microsoft.com/office/powerpoint/2010/main" val="3295934818"/>
+      </p:ext>
+    </p:extLst>
+  </p:cSld>
+  <p:clrMapOvr>
+    <a:masterClrMapping/>
+  </p:clrMapOvr>
+</p:sld>
+</file>
+
+<file path=ppt/slides/slide12.xml><?xml version="1.0" encoding="utf-8"?>
+<p:sld xmlns:a="http://schemas.openxmlformats.org/drawingml/2006/main" xmlns:r="http://schemas.openxmlformats.org/officeDocument/2006/relationships" xmlns:p="http://schemas.openxmlformats.org/presentationml/2006/main">
+  <p:cSld>
+    <p:spTree>
+      <p:nvGrpSpPr>
+        <p:cNvPr id="1" name=""/>
+        <p:cNvGrpSpPr/>
+        <p:nvPr/>
+      </p:nvGrpSpPr>
+      <p:grpSpPr>
+        <a:xfrm>
+          <a:off x="0" y="0"/>
+          <a:ext cx="0" cy="0"/>
+          <a:chOff x="0" y="0"/>
+          <a:chExt cx="0" cy="0"/>
+        </a:xfrm>
+      </p:grpSpPr>
+      <p:sp>
+        <p:nvSpPr>
+          <p:cNvPr id="2" name="Title 1">
+            <a:extLst>
+              <a:ext uri="{FF2B5EF4-FFF2-40B4-BE49-F238E27FC236}">
+                <a16:creationId xmlns:a16="http://schemas.microsoft.com/office/drawing/2014/main" id="{91080CAB-3953-4ED9-B496-54A32E9C9EA1}"/>
+              </a:ext>
+            </a:extLst>
+          </p:cNvPr>
+          <p:cNvSpPr>
+            <a:spLocks noGrp="1"/>
+          </p:cNvSpPr>
+          <p:nvPr>
+            <p:ph type="title"/>
+          </p:nvPr>
+        </p:nvSpPr>
+        <p:spPr/>
+        <p:txBody>
+          <a:bodyPr/>
+          <a:lstStyle/>
+          <a:p>
+            <a:r>
+              <a:rPr lang="en-US" dirty="0"/>
+              <a:t>References</a:t>
+            </a:r>
+          </a:p>
+        </p:txBody>
+      </p:sp>
+      <p:sp>
+        <p:nvSpPr>
+          <p:cNvPr id="3" name="Content Placeholder 2">
+            <a:extLst>
+              <a:ext uri="{FF2B5EF4-FFF2-40B4-BE49-F238E27FC236}">
+                <a16:creationId xmlns:a16="http://schemas.microsoft.com/office/drawing/2014/main" id="{17408EF5-712C-4333-99D4-0EFA384BF9B7}"/>
+              </a:ext>
+            </a:extLst>
+          </p:cNvPr>
+          <p:cNvSpPr>
+            <a:spLocks noGrp="1"/>
+          </p:cNvSpPr>
+          <p:nvPr>
+            <p:ph idx="1"/>
+          </p:nvPr>
+        </p:nvSpPr>
+        <p:spPr>
+          <a:xfrm>
+            <a:off x="677334" y="1349829"/>
+            <a:ext cx="8596668" cy="4691533"/>
+          </a:xfrm>
+        </p:spPr>
+        <p:txBody>
+          <a:bodyPr>
+            <a:normAutofit/>
+          </a:bodyPr>
+          <a:lstStyle/>
+          <a:p>
+            <a:r>
+              <a:rPr lang="en-US" dirty="0"/>
+              <a:t>[1] Giordano N. 1997. </a:t>
+            </a:r>
+            <a:r>
+              <a:rPr lang="en-US" i="1" dirty="0"/>
+              <a:t>Computational Physics</a:t>
+            </a:r>
+            <a:r>
+              <a:rPr lang="en-US" dirty="0"/>
+              <a:t>. Upper Sadie River, NJ: </a:t>
+            </a:r>
+            <a:r>
+              <a:rPr lang="en-US" dirty="0" err="1"/>
+              <a:t>Pretence</a:t>
+            </a:r>
+            <a:r>
+              <a:rPr lang="en-US" dirty="0"/>
+              <a:t>-Hall </a:t>
+            </a:r>
+            <a:r>
+              <a:rPr lang="en-US" dirty="0" err="1"/>
+              <a:t>inc.</a:t>
+            </a:r>
+            <a:r>
+              <a:rPr lang="en-US" dirty="0"/>
+              <a:t> p. 315-328</a:t>
+            </a:r>
+          </a:p>
+          <a:p>
+            <a:r>
+              <a:rPr lang="en-US" dirty="0"/>
+              <a:t>[2] </a:t>
+            </a:r>
+            <a:r>
+              <a:rPr lang="en-US" dirty="0" err="1"/>
+              <a:t>Sammis</a:t>
+            </a:r>
+            <a:r>
+              <a:rPr lang="en-US" dirty="0"/>
+              <a:t> C, Smith S. 1999. </a:t>
+            </a:r>
+            <a:r>
+              <a:rPr lang="en-US" i="1" dirty="0"/>
+              <a:t>Seismic Cycles and the Evolution of Stress Correlation in Cellular Automaton Models of Finite Fault Networks</a:t>
+            </a:r>
+            <a:r>
+              <a:rPr lang="en-US" dirty="0"/>
+              <a:t>. Pure and Applied Geophysics. 155(1)</a:t>
+            </a:r>
+          </a:p>
+          <a:p>
+            <a:r>
+              <a:rPr lang="en-US" dirty="0"/>
+              <a:t>[3] R. Burridge, L. </a:t>
+            </a:r>
+            <a:r>
+              <a:rPr lang="en-US" dirty="0" err="1"/>
+              <a:t>Knopoff</a:t>
+            </a:r>
+            <a:r>
+              <a:rPr lang="en-US" dirty="0"/>
+              <a:t>; </a:t>
+            </a:r>
+            <a:r>
+              <a:rPr lang="en-US" i="1" dirty="0"/>
+              <a:t>Body force equivalents for seismic dislocations. Bulletin of the Seismological Society of America</a:t>
+            </a:r>
+            <a:r>
+              <a:rPr lang="en-US" dirty="0"/>
+              <a:t> ; 54 (6A): 1875–1888</a:t>
+            </a:r>
+          </a:p>
+          <a:p>
+            <a:r>
+              <a:rPr lang="en-US" dirty="0"/>
+              <a:t>[4] Márquez-Ramírez, V.H., Nava, F.A. &amp; </a:t>
+            </a:r>
+            <a:r>
+              <a:rPr lang="en-US" dirty="0" err="1"/>
+              <a:t>Zúñiga</a:t>
+            </a:r>
+            <a:r>
+              <a:rPr lang="en-US" dirty="0"/>
+              <a:t>, F.R. </a:t>
+            </a:r>
+            <a:r>
+              <a:rPr lang="en-US" i="1" dirty="0"/>
+              <a:t>Correcting the Gutenberg–Richter b-value for effects of rounding and noise</a:t>
+            </a:r>
+            <a:r>
+              <a:rPr lang="en-US" dirty="0"/>
+              <a:t>. </a:t>
+            </a:r>
+            <a:r>
+              <a:rPr lang="en-US" dirty="0" err="1"/>
+              <a:t>Earthq</a:t>
+            </a:r>
+            <a:r>
+              <a:rPr lang="en-US" dirty="0"/>
+              <a:t> Sci (2015) 28: 129. </a:t>
+            </a:r>
+          </a:p>
+          <a:p>
+            <a:r>
+              <a:rPr lang="en-US" dirty="0"/>
+              <a:t>Image sources:</a:t>
+            </a:r>
+          </a:p>
+          <a:p>
+            <a:pPr lvl="1"/>
+            <a:r>
+              <a:rPr lang="en-US" dirty="0"/>
+              <a:t> </a:t>
+            </a:r>
+            <a:r>
+              <a:rPr lang="en-US" dirty="0">
+                <a:hlinkClick r:id="rId2"/>
+              </a:rPr>
+              <a:t>https://www.hope-education.co.uk/product/primary/geography/physical-geography/tectonic-plates-map/he1534836</a:t>
+            </a:r>
+            <a:r>
+              <a:rPr lang="en-US" dirty="0"/>
+              <a:t> </a:t>
+            </a:r>
+          </a:p>
+          <a:p>
+            <a:pPr lvl="1"/>
+            <a:r>
+              <a:rPr lang="en-US" dirty="0">
+                <a:hlinkClick r:id="rId3"/>
+              </a:rPr>
+              <a:t>https://en.wikipedia.org/wiki/Euler_method</a:t>
+            </a:r>
+            <a:endParaRPr lang="en-US" dirty="0"/>
+          </a:p>
+          <a:p>
+            <a:pPr lvl="1"/>
+            <a:endParaRPr lang="en-US" dirty="0"/>
+          </a:p>
+        </p:txBody>
+      </p:sp>
+    </p:spTree>
+    <p:extLst>
+      <p:ext uri="{BB962C8B-B14F-4D97-AF65-F5344CB8AC3E}">
+        <p14:creationId xmlns:p14="http://schemas.microsoft.com/office/powerpoint/2010/main" val="1532519968"/>
+      </p:ext>
+    </p:extLst>
+  </p:cSld>
+  <p:clrMapOvr>
+    <a:masterClrMapping/>
+  </p:clrMapOvr>
+</p:sld>
+</file>
+
 <file path=ppt/slides/slide2.xml><?xml version="1.0" encoding="utf-8"?>
 <p:sld xmlns:a="http://schemas.openxmlformats.org/drawingml/2006/main" xmlns:r="http://schemas.openxmlformats.org/officeDocument/2006/relationships" xmlns:p="http://schemas.openxmlformats.org/presentationml/2006/main">
   <p:cSld>
@@ -5964,14 +6452,25 @@
             <p:ph idx="1"/>
           </p:nvPr>
         </p:nvSpPr>
-        <p:spPr/>
+        <p:spPr>
+          <a:xfrm>
+            <a:off x="677334" y="1253329"/>
+            <a:ext cx="8596668" cy="3880773"/>
+          </a:xfrm>
+        </p:spPr>
         <p:txBody>
           <a:bodyPr/>
           <a:lstStyle/>
           <a:p>
             <a:r>
               <a:rPr lang="en-US" dirty="0"/>
-              <a:t>Purpose: Predicting earthquakes</a:t>
+              <a:t>What are earthquakes?</a:t>
+            </a:r>
+          </a:p>
+          <a:p>
+            <a:r>
+              <a:rPr lang="en-US" dirty="0"/>
+              <a:t>How can we predict earthquakes?</a:t>
             </a:r>
           </a:p>
           <a:p>
@@ -5980,15 +6479,51 @@
               <a:t>Self Organized Criticality: Shift towards critical point</a:t>
             </a:r>
           </a:p>
-          <a:p>
-            <a:pPr lvl="1"/>
-            <a:r>
-              <a:rPr lang="en-US" dirty="0"/>
-              <a:t>Constant, or Periodic?</a:t>
-            </a:r>
-          </a:p>
-        </p:txBody>
-      </p:sp>
+        </p:txBody>
+      </p:sp>
+      <p:pic>
+        <p:nvPicPr>
+          <p:cNvPr id="4" name="Picture 3">
+            <a:extLst>
+              <a:ext uri="{FF2B5EF4-FFF2-40B4-BE49-F238E27FC236}">
+                <a16:creationId xmlns:a16="http://schemas.microsoft.com/office/drawing/2014/main" id="{F430606C-6938-4087-A3A8-FD9D1C894176}"/>
+              </a:ext>
+            </a:extLst>
+          </p:cNvPr>
+          <p:cNvPicPr>
+            <a:picLocks noChangeAspect="1"/>
+          </p:cNvPicPr>
+          <p:nvPr/>
+        </p:nvPicPr>
+        <p:blipFill rotWithShape="1">
+          <a:blip r:embed="rId2"/>
+          <a:srcRect t="14695" b="12884"/>
+          <a:stretch/>
+        </p:blipFill>
+        <p:spPr>
+          <a:xfrm>
+            <a:off x="3491842" y="2671762"/>
+            <a:ext cx="5208316" cy="3771901"/>
+          </a:xfrm>
+          <a:prstGeom prst="rect">
+            <a:avLst/>
+          </a:prstGeom>
+        </p:spPr>
+        <p:style>
+          <a:lnRef idx="2">
+            <a:schemeClr val="accent1"/>
+          </a:lnRef>
+          <a:fillRef idx="1">
+            <a:schemeClr val="lt1"/>
+          </a:fillRef>
+          <a:effectRef idx="0">
+            <a:schemeClr val="accent1"/>
+          </a:effectRef>
+          <a:fontRef idx="minor">
+            <a:schemeClr val="dk1"/>
+          </a:fontRef>
+        </p:style>
+      </p:pic>
     </p:spTree>
     <p:extLst>
       <p:ext uri="{BB962C8B-B14F-4D97-AF65-F5344CB8AC3E}">
@@ -6024,7 +6559,7 @@
           <p:cNvPr id="2" name="Title 1">
             <a:extLst>
               <a:ext uri="{FF2B5EF4-FFF2-40B4-BE49-F238E27FC236}">
-                <a16:creationId xmlns:a16="http://schemas.microsoft.com/office/drawing/2014/main" id="{0EE4B5C6-8731-44C2-8095-209A952EBC05}"/>
+                <a16:creationId xmlns:a16="http://schemas.microsoft.com/office/drawing/2014/main" id="{BB2FBFA4-AD82-4960-8931-E7F8C8CF18DB}"/>
               </a:ext>
             </a:extLst>
           </p:cNvPr>
@@ -6042,7 +6577,7 @@
           <a:p>
             <a:r>
               <a:rPr lang="en-US" dirty="0"/>
-              <a:t>The Block Spring Model</a:t>
+              <a:t>Gutenberg-Richter Law</a:t>
             </a:r>
           </a:p>
         </p:txBody>
@@ -6052,7 +6587,7 @@
           <p:cNvPr id="3" name="Content Placeholder 2">
             <a:extLst>
               <a:ext uri="{FF2B5EF4-FFF2-40B4-BE49-F238E27FC236}">
-                <a16:creationId xmlns:a16="http://schemas.microsoft.com/office/drawing/2014/main" id="{C4E08536-744C-4772-99FD-3FE760409220}"/>
+                <a16:creationId xmlns:a16="http://schemas.microsoft.com/office/drawing/2014/main" id="{192B1207-2348-4F23-B8A0-6543B1219B95}"/>
               </a:ext>
             </a:extLst>
           </p:cNvPr>
@@ -6063,644 +6598,67 @@
             <p:ph idx="1"/>
           </p:nvPr>
         </p:nvSpPr>
-        <p:spPr>
-          <a:xfrm>
-            <a:off x="677334" y="1488613"/>
-            <a:ext cx="8596668" cy="3880773"/>
-          </a:xfrm>
-        </p:spPr>
+        <p:spPr/>
         <p:txBody>
           <a:bodyPr/>
           <a:lstStyle/>
           <a:p>
             <a:r>
               <a:rPr lang="en-US" dirty="0"/>
-              <a:t>Proposed by Burridge and </a:t>
-            </a:r>
-            <a:r>
-              <a:rPr lang="en-US" dirty="0" err="1"/>
-              <a:t>Knopoff</a:t>
-            </a:r>
+              <a:t>The probability of an earthquake of a certain magnitude decays exponentially with magnitude</a:t>
+            </a:r>
+          </a:p>
+          <a:p>
+            <a:pPr marL="0" indent="0" algn="ctr">
+              <a:buNone/>
+            </a:pPr>
             <a:r>
               <a:rPr lang="en-US" dirty="0"/>
-              <a:t> in 1967.</a:t>
-            </a:r>
-          </a:p>
-          <a:p>
+              <a:t>P(</a:t>
+            </a:r>
+            <a:r>
+              <a:rPr lang="en-US" b="1" dirty="0"/>
+              <a:t>M</a:t>
+            </a:r>
             <a:r>
               <a:rPr lang="en-US" dirty="0"/>
-              <a:t>Uses blocks to represent fault line from top view.</a:t>
-            </a:r>
-          </a:p>
-        </p:txBody>
-      </p:sp>
-      <p:pic>
-        <p:nvPicPr>
-          <p:cNvPr id="5" name="Picture 4" descr="A screenshot of a cell phone&#10;&#10;Description generated with very high confidence">
-            <a:extLst>
-              <a:ext uri="{FF2B5EF4-FFF2-40B4-BE49-F238E27FC236}">
-                <a16:creationId xmlns:a16="http://schemas.microsoft.com/office/drawing/2014/main" id="{0632FFB2-E83A-4962-A9AF-AA21EDCB31AA}"/>
-              </a:ext>
-            </a:extLst>
-          </p:cNvPr>
-          <p:cNvPicPr>
-            <a:picLocks noChangeAspect="1"/>
-          </p:cNvPicPr>
-          <p:nvPr/>
-        </p:nvPicPr>
-        <p:blipFill>
-          <a:blip r:embed="rId2">
-            <a:extLst>
-              <a:ext uri="{28A0092B-C50C-407E-A947-70E740481C1C}">
-                <a14:useLocalDpi xmlns:a14="http://schemas.microsoft.com/office/drawing/2010/main" val="0"/>
-              </a:ext>
-            </a:extLst>
-          </a:blip>
-          <a:stretch>
-            <a:fillRect/>
-          </a:stretch>
-        </p:blipFill>
-        <p:spPr>
-          <a:xfrm>
-            <a:off x="3497014" y="2409664"/>
-            <a:ext cx="5197950" cy="4018028"/>
-          </a:xfrm>
-          <a:prstGeom prst="rect">
-            <a:avLst/>
-          </a:prstGeom>
-        </p:spPr>
-      </p:pic>
-      <p:pic>
-        <p:nvPicPr>
-          <p:cNvPr id="7" name="Picture 6" descr="A close up of a logo&#10;&#10;Description generated with very high confidence">
-            <a:extLst>
-              <a:ext uri="{FF2B5EF4-FFF2-40B4-BE49-F238E27FC236}">
-                <a16:creationId xmlns:a16="http://schemas.microsoft.com/office/drawing/2014/main" id="{34720377-B497-4CF6-BB57-5B2192245A48}"/>
-              </a:ext>
-            </a:extLst>
-          </p:cNvPr>
-          <p:cNvPicPr>
-            <a:picLocks noChangeAspect="1"/>
-          </p:cNvPicPr>
-          <p:nvPr/>
-        </p:nvPicPr>
-        <p:blipFill>
-          <a:blip r:embed="rId3">
-            <a:extLst>
-              <a:ext uri="{28A0092B-C50C-407E-A947-70E740481C1C}">
-                <a14:useLocalDpi xmlns:a14="http://schemas.microsoft.com/office/drawing/2010/main" val="0"/>
-              </a:ext>
-            </a:extLst>
-          </a:blip>
-          <a:stretch>
-            <a:fillRect/>
-          </a:stretch>
-        </p:blipFill>
-        <p:spPr>
-          <a:xfrm>
-            <a:off x="3497018" y="2409664"/>
-            <a:ext cx="5197950" cy="4018028"/>
-          </a:xfrm>
-          <a:prstGeom prst="rect">
-            <a:avLst/>
-          </a:prstGeom>
-        </p:spPr>
-      </p:pic>
-      <p:pic>
-        <p:nvPicPr>
-          <p:cNvPr id="9" name="Picture 8" descr="A screenshot of a cell phone&#10;&#10;Description generated with high confidence">
-            <a:extLst>
-              <a:ext uri="{FF2B5EF4-FFF2-40B4-BE49-F238E27FC236}">
-                <a16:creationId xmlns:a16="http://schemas.microsoft.com/office/drawing/2014/main" id="{0E21386B-36C2-4358-A7C6-87477AAB1562}"/>
-              </a:ext>
-            </a:extLst>
-          </p:cNvPr>
-          <p:cNvPicPr>
-            <a:picLocks noChangeAspect="1"/>
-          </p:cNvPicPr>
-          <p:nvPr/>
-        </p:nvPicPr>
-        <p:blipFill>
-          <a:blip r:embed="rId4">
-            <a:extLst>
-              <a:ext uri="{28A0092B-C50C-407E-A947-70E740481C1C}">
-                <a14:useLocalDpi xmlns:a14="http://schemas.microsoft.com/office/drawing/2010/main" val="0"/>
-              </a:ext>
-            </a:extLst>
-          </a:blip>
-          <a:stretch>
-            <a:fillRect/>
-          </a:stretch>
-        </p:blipFill>
-        <p:spPr>
-          <a:xfrm>
-            <a:off x="3497021" y="2409663"/>
-            <a:ext cx="5197951" cy="4018029"/>
-          </a:xfrm>
-          <a:prstGeom prst="rect">
-            <a:avLst/>
-          </a:prstGeom>
-        </p:spPr>
-      </p:pic>
-      <p:pic>
-        <p:nvPicPr>
-          <p:cNvPr id="11" name="Picture 10" descr="A close up of a device&#10;&#10;Description generated with high confidence">
-            <a:extLst>
-              <a:ext uri="{FF2B5EF4-FFF2-40B4-BE49-F238E27FC236}">
-                <a16:creationId xmlns:a16="http://schemas.microsoft.com/office/drawing/2014/main" id="{533EB65F-039A-4549-9223-F399635696B5}"/>
-              </a:ext>
-            </a:extLst>
-          </p:cNvPr>
-          <p:cNvPicPr>
-            <a:picLocks noChangeAspect="1"/>
-          </p:cNvPicPr>
-          <p:nvPr/>
-        </p:nvPicPr>
-        <p:blipFill>
-          <a:blip r:embed="rId5">
-            <a:extLst>
-              <a:ext uri="{28A0092B-C50C-407E-A947-70E740481C1C}">
-                <a14:useLocalDpi xmlns:a14="http://schemas.microsoft.com/office/drawing/2010/main" val="0"/>
-              </a:ext>
-            </a:extLst>
-          </a:blip>
-          <a:stretch>
-            <a:fillRect/>
-          </a:stretch>
-        </p:blipFill>
-        <p:spPr>
-          <a:xfrm>
-            <a:off x="3497021" y="2409664"/>
-            <a:ext cx="5197951" cy="4018028"/>
-          </a:xfrm>
-          <a:prstGeom prst="rect">
-            <a:avLst/>
-          </a:prstGeom>
-        </p:spPr>
-      </p:pic>
-      <p:pic>
-        <p:nvPicPr>
-          <p:cNvPr id="13" name="Picture 12" descr="A screenshot of a cell phone&#10;&#10;Description generated with high confidence">
-            <a:extLst>
-              <a:ext uri="{FF2B5EF4-FFF2-40B4-BE49-F238E27FC236}">
-                <a16:creationId xmlns:a16="http://schemas.microsoft.com/office/drawing/2014/main" id="{FDBC142D-90DA-4904-9B0D-54FA6E5F5D65}"/>
-              </a:ext>
-            </a:extLst>
-          </p:cNvPr>
-          <p:cNvPicPr>
-            <a:picLocks noChangeAspect="1"/>
-          </p:cNvPicPr>
-          <p:nvPr/>
-        </p:nvPicPr>
-        <p:blipFill>
-          <a:blip r:embed="rId6">
-            <a:extLst>
-              <a:ext uri="{28A0092B-C50C-407E-A947-70E740481C1C}">
-                <a14:useLocalDpi xmlns:a14="http://schemas.microsoft.com/office/drawing/2010/main" val="0"/>
-              </a:ext>
-            </a:extLst>
-          </a:blip>
-          <a:stretch>
-            <a:fillRect/>
-          </a:stretch>
-        </p:blipFill>
-        <p:spPr>
-          <a:xfrm>
-            <a:off x="3497022" y="2409665"/>
-            <a:ext cx="5197952" cy="4018029"/>
-          </a:xfrm>
-          <a:prstGeom prst="rect">
-            <a:avLst/>
-          </a:prstGeom>
-        </p:spPr>
-      </p:pic>
-      <p:pic>
-        <p:nvPicPr>
-          <p:cNvPr id="15" name="Picture 14">
-            <a:extLst>
-              <a:ext uri="{FF2B5EF4-FFF2-40B4-BE49-F238E27FC236}">
-                <a16:creationId xmlns:a16="http://schemas.microsoft.com/office/drawing/2014/main" id="{F824B619-5389-4721-A9B8-D35AC8E5B533}"/>
-              </a:ext>
-            </a:extLst>
-          </p:cNvPr>
-          <p:cNvPicPr>
-            <a:picLocks noChangeAspect="1"/>
-          </p:cNvPicPr>
-          <p:nvPr/>
-        </p:nvPicPr>
-        <p:blipFill>
-          <a:blip r:embed="rId7">
-            <a:extLst>
-              <a:ext uri="{28A0092B-C50C-407E-A947-70E740481C1C}">
-                <a14:useLocalDpi xmlns:a14="http://schemas.microsoft.com/office/drawing/2010/main" val="0"/>
-              </a:ext>
-            </a:extLst>
-          </a:blip>
-          <a:stretch>
-            <a:fillRect/>
-          </a:stretch>
-        </p:blipFill>
-        <p:spPr>
-          <a:xfrm>
-            <a:off x="3497023" y="2409665"/>
-            <a:ext cx="5197952" cy="4018029"/>
-          </a:xfrm>
-          <a:prstGeom prst="rect">
-            <a:avLst/>
-          </a:prstGeom>
-        </p:spPr>
-      </p:pic>
-      <p:pic>
-        <p:nvPicPr>
-          <p:cNvPr id="17" name="Picture 16" descr="A picture containing antenna, object&#10;&#10;Description generated with very high confidence">
-            <a:extLst>
-              <a:ext uri="{FF2B5EF4-FFF2-40B4-BE49-F238E27FC236}">
-                <a16:creationId xmlns:a16="http://schemas.microsoft.com/office/drawing/2014/main" id="{4AAB5321-21AA-41EE-85EB-F79C1972943A}"/>
-              </a:ext>
-            </a:extLst>
-          </p:cNvPr>
-          <p:cNvPicPr>
-            <a:picLocks noChangeAspect="1"/>
-          </p:cNvPicPr>
-          <p:nvPr/>
-        </p:nvPicPr>
-        <p:blipFill>
-          <a:blip r:embed="rId8">
-            <a:extLst>
-              <a:ext uri="{28A0092B-C50C-407E-A947-70E740481C1C}">
-                <a14:useLocalDpi xmlns:a14="http://schemas.microsoft.com/office/drawing/2010/main" val="0"/>
-              </a:ext>
-            </a:extLst>
-          </a:blip>
-          <a:stretch>
-            <a:fillRect/>
-          </a:stretch>
-        </p:blipFill>
-        <p:spPr>
-          <a:xfrm>
-            <a:off x="3497023" y="2409665"/>
-            <a:ext cx="5197952" cy="4018029"/>
-          </a:xfrm>
-          <a:prstGeom prst="rect">
-            <a:avLst/>
-          </a:prstGeom>
-        </p:spPr>
-      </p:pic>
+              <a:t>)=Ae</a:t>
+            </a:r>
+            <a:r>
+              <a:rPr lang="en-US" baseline="30000" dirty="0"/>
+              <a:t>−</a:t>
+            </a:r>
+            <a:r>
+              <a:rPr lang="en-US" baseline="30000" dirty="0" err="1"/>
+              <a:t>b</a:t>
+            </a:r>
+            <a:r>
+              <a:rPr lang="en-US" b="1" baseline="30000" dirty="0" err="1"/>
+              <a:t>M</a:t>
+            </a:r>
+            <a:endParaRPr lang="en-US" dirty="0"/>
+          </a:p>
+          <a:p>
+            <a:r>
+              <a:rPr lang="en-US" dirty="0"/>
+              <a:t>From real-life statistics: 0.9 &lt; b &lt; 1.1</a:t>
+            </a:r>
+          </a:p>
+          <a:p>
+            <a:endParaRPr lang="en-US" baseline="30000" dirty="0"/>
+          </a:p>
+        </p:txBody>
+      </p:sp>
     </p:spTree>
     <p:extLst>
       <p:ext uri="{BB962C8B-B14F-4D97-AF65-F5344CB8AC3E}">
-        <p14:creationId xmlns:p14="http://schemas.microsoft.com/office/powerpoint/2010/main" val="1379320804"/>
+        <p14:creationId xmlns:p14="http://schemas.microsoft.com/office/powerpoint/2010/main" val="1881386474"/>
       </p:ext>
     </p:extLst>
   </p:cSld>
   <p:clrMapOvr>
     <a:masterClrMapping/>
   </p:clrMapOvr>
-  <p:timing>
-    <p:tnLst>
-      <p:par>
-        <p:cTn id="1" dur="indefinite" restart="never" nodeType="tmRoot">
-          <p:childTnLst>
-            <p:seq concurrent="1" nextAc="seek">
-              <p:cTn id="2" dur="indefinite" nodeType="mainSeq">
-                <p:childTnLst>
-                  <p:par>
-                    <p:cTn id="3" fill="hold">
-                      <p:stCondLst>
-                        <p:cond delay="indefinite"/>
-                      </p:stCondLst>
-                      <p:childTnLst>
-                        <p:par>
-                          <p:cTn id="4" fill="hold">
-                            <p:stCondLst>
-                              <p:cond delay="0"/>
-                            </p:stCondLst>
-                            <p:childTnLst>
-                              <p:par>
-                                <p:cTn id="5" presetID="1" presetClass="entr" presetSubtype="0" fill="hold" nodeType="clickEffect">
-                                  <p:stCondLst>
-                                    <p:cond delay="0"/>
-                                  </p:stCondLst>
-                                  <p:childTnLst>
-                                    <p:set>
-                                      <p:cBhvr>
-                                        <p:cTn id="6" dur="1" fill="hold">
-                                          <p:stCondLst>
-                                            <p:cond delay="0"/>
-                                          </p:stCondLst>
-                                        </p:cTn>
-                                        <p:tgtEl>
-                                          <p:spTgt spid="5"/>
-                                        </p:tgtEl>
-                                        <p:attrNameLst>
-                                          <p:attrName>style.visibility</p:attrName>
-                                        </p:attrNameLst>
-                                      </p:cBhvr>
-                                      <p:to>
-                                        <p:strVal val="visible"/>
-                                      </p:to>
-                                    </p:set>
-                                  </p:childTnLst>
-                                </p:cTn>
-                              </p:par>
-                            </p:childTnLst>
-                          </p:cTn>
-                        </p:par>
-                      </p:childTnLst>
-                    </p:cTn>
-                  </p:par>
-                  <p:par>
-                    <p:cTn id="7" fill="hold">
-                      <p:stCondLst>
-                        <p:cond delay="indefinite"/>
-                      </p:stCondLst>
-                      <p:childTnLst>
-                        <p:par>
-                          <p:cTn id="8" fill="hold">
-                            <p:stCondLst>
-                              <p:cond delay="0"/>
-                            </p:stCondLst>
-                            <p:childTnLst>
-                              <p:par>
-                                <p:cTn id="9" presetID="1" presetClass="entr" presetSubtype="0" fill="hold" nodeType="clickEffect">
-                                  <p:stCondLst>
-                                    <p:cond delay="0"/>
-                                  </p:stCondLst>
-                                  <p:childTnLst>
-                                    <p:set>
-                                      <p:cBhvr>
-                                        <p:cTn id="10" dur="1" fill="hold">
-                                          <p:stCondLst>
-                                            <p:cond delay="0"/>
-                                          </p:stCondLst>
-                                        </p:cTn>
-                                        <p:tgtEl>
-                                          <p:spTgt spid="7"/>
-                                        </p:tgtEl>
-                                        <p:attrNameLst>
-                                          <p:attrName>style.visibility</p:attrName>
-                                        </p:attrNameLst>
-                                      </p:cBhvr>
-                                      <p:to>
-                                        <p:strVal val="visible"/>
-                                      </p:to>
-                                    </p:set>
-                                  </p:childTnLst>
-                                </p:cTn>
-                              </p:par>
-                            </p:childTnLst>
-                          </p:cTn>
-                        </p:par>
-                      </p:childTnLst>
-                    </p:cTn>
-                  </p:par>
-                  <p:par>
-                    <p:cTn id="11" fill="hold">
-                      <p:stCondLst>
-                        <p:cond delay="indefinite"/>
-                      </p:stCondLst>
-                      <p:childTnLst>
-                        <p:par>
-                          <p:cTn id="12" fill="hold">
-                            <p:stCondLst>
-                              <p:cond delay="0"/>
-                            </p:stCondLst>
-                            <p:childTnLst>
-                              <p:par>
-                                <p:cTn id="13" presetID="1" presetClass="entr" presetSubtype="0" fill="hold" nodeType="clickEffect">
-                                  <p:stCondLst>
-                                    <p:cond delay="0"/>
-                                  </p:stCondLst>
-                                  <p:childTnLst>
-                                    <p:set>
-                                      <p:cBhvr>
-                                        <p:cTn id="14" dur="1" fill="hold">
-                                          <p:stCondLst>
-                                            <p:cond delay="0"/>
-                                          </p:stCondLst>
-                                        </p:cTn>
-                                        <p:tgtEl>
-                                          <p:spTgt spid="9"/>
-                                        </p:tgtEl>
-                                        <p:attrNameLst>
-                                          <p:attrName>style.visibility</p:attrName>
-                                        </p:attrNameLst>
-                                      </p:cBhvr>
-                                      <p:to>
-                                        <p:strVal val="visible"/>
-                                      </p:to>
-                                    </p:set>
-                                  </p:childTnLst>
-                                </p:cTn>
-                              </p:par>
-                            </p:childTnLst>
-                          </p:cTn>
-                        </p:par>
-                      </p:childTnLst>
-                    </p:cTn>
-                  </p:par>
-                  <p:par>
-                    <p:cTn id="15" fill="hold">
-                      <p:stCondLst>
-                        <p:cond delay="indefinite"/>
-                      </p:stCondLst>
-                      <p:childTnLst>
-                        <p:par>
-                          <p:cTn id="16" fill="hold">
-                            <p:stCondLst>
-                              <p:cond delay="0"/>
-                            </p:stCondLst>
-                            <p:childTnLst>
-                              <p:par>
-                                <p:cTn id="17" presetID="1" presetClass="entr" presetSubtype="0" fill="hold" nodeType="clickEffect">
-                                  <p:stCondLst>
-                                    <p:cond delay="0"/>
-                                  </p:stCondLst>
-                                  <p:childTnLst>
-                                    <p:set>
-                                      <p:cBhvr>
-                                        <p:cTn id="18" dur="1" fill="hold">
-                                          <p:stCondLst>
-                                            <p:cond delay="0"/>
-                                          </p:stCondLst>
-                                        </p:cTn>
-                                        <p:tgtEl>
-                                          <p:spTgt spid="11"/>
-                                        </p:tgtEl>
-                                        <p:attrNameLst>
-                                          <p:attrName>style.visibility</p:attrName>
-                                        </p:attrNameLst>
-                                      </p:cBhvr>
-                                      <p:to>
-                                        <p:strVal val="visible"/>
-                                      </p:to>
-                                    </p:set>
-                                  </p:childTnLst>
-                                </p:cTn>
-                              </p:par>
-                            </p:childTnLst>
-                          </p:cTn>
-                        </p:par>
-                      </p:childTnLst>
-                    </p:cTn>
-                  </p:par>
-                  <p:par>
-                    <p:cTn id="19" fill="hold">
-                      <p:stCondLst>
-                        <p:cond delay="indefinite"/>
-                      </p:stCondLst>
-                      <p:childTnLst>
-                        <p:par>
-                          <p:cTn id="20" fill="hold">
-                            <p:stCondLst>
-                              <p:cond delay="0"/>
-                            </p:stCondLst>
-                            <p:childTnLst>
-                              <p:par>
-                                <p:cTn id="21" presetID="1" presetClass="entr" presetSubtype="0" fill="hold" nodeType="clickEffect">
-                                  <p:stCondLst>
-                                    <p:cond delay="0"/>
-                                  </p:stCondLst>
-                                  <p:childTnLst>
-                                    <p:set>
-                                      <p:cBhvr>
-                                        <p:cTn id="22" dur="1" fill="hold">
-                                          <p:stCondLst>
-                                            <p:cond delay="0"/>
-                                          </p:stCondLst>
-                                        </p:cTn>
-                                        <p:tgtEl>
-                                          <p:spTgt spid="13"/>
-                                        </p:tgtEl>
-                                        <p:attrNameLst>
-                                          <p:attrName>style.visibility</p:attrName>
-                                        </p:attrNameLst>
-                                      </p:cBhvr>
-                                      <p:to>
-                                        <p:strVal val="visible"/>
-                                      </p:to>
-                                    </p:set>
-                                  </p:childTnLst>
-                                </p:cTn>
-                              </p:par>
-                            </p:childTnLst>
-                          </p:cTn>
-                        </p:par>
-                      </p:childTnLst>
-                    </p:cTn>
-                  </p:par>
-                  <p:par>
-                    <p:cTn id="23" fill="hold">
-                      <p:stCondLst>
-                        <p:cond delay="indefinite"/>
-                      </p:stCondLst>
-                      <p:childTnLst>
-                        <p:par>
-                          <p:cTn id="24" fill="hold">
-                            <p:stCondLst>
-                              <p:cond delay="0"/>
-                            </p:stCondLst>
-                            <p:childTnLst>
-                              <p:par>
-                                <p:cTn id="25" presetID="1" presetClass="entr" presetSubtype="0" fill="hold" nodeType="clickEffect">
-                                  <p:stCondLst>
-                                    <p:cond delay="0"/>
-                                  </p:stCondLst>
-                                  <p:childTnLst>
-                                    <p:set>
-                                      <p:cBhvr>
-                                        <p:cTn id="26" dur="1" fill="hold">
-                                          <p:stCondLst>
-                                            <p:cond delay="0"/>
-                                          </p:stCondLst>
-                                        </p:cTn>
-                                        <p:tgtEl>
-                                          <p:spTgt spid="15"/>
-                                        </p:tgtEl>
-                                        <p:attrNameLst>
-                                          <p:attrName>style.visibility</p:attrName>
-                                        </p:attrNameLst>
-                                      </p:cBhvr>
-                                      <p:to>
-                                        <p:strVal val="visible"/>
-                                      </p:to>
-                                    </p:set>
-                                  </p:childTnLst>
-                                </p:cTn>
-                              </p:par>
-                            </p:childTnLst>
-                          </p:cTn>
-                        </p:par>
-                      </p:childTnLst>
-                    </p:cTn>
-                  </p:par>
-                  <p:par>
-                    <p:cTn id="27" fill="hold">
-                      <p:stCondLst>
-                        <p:cond delay="indefinite"/>
-                      </p:stCondLst>
-                      <p:childTnLst>
-                        <p:par>
-                          <p:cTn id="28" fill="hold">
-                            <p:stCondLst>
-                              <p:cond delay="0"/>
-                            </p:stCondLst>
-                            <p:childTnLst>
-                              <p:par>
-                                <p:cTn id="29" presetID="1" presetClass="entr" presetSubtype="0" fill="hold" nodeType="clickEffect">
-                                  <p:stCondLst>
-                                    <p:cond delay="0"/>
-                                  </p:stCondLst>
-                                  <p:childTnLst>
-                                    <p:set>
-                                      <p:cBhvr>
-                                        <p:cTn id="30" dur="1" fill="hold">
-                                          <p:stCondLst>
-                                            <p:cond delay="0"/>
-                                          </p:stCondLst>
-                                        </p:cTn>
-                                        <p:tgtEl>
-                                          <p:spTgt spid="17"/>
-                                        </p:tgtEl>
-                                        <p:attrNameLst>
-                                          <p:attrName>style.visibility</p:attrName>
-                                        </p:attrNameLst>
-                                      </p:cBhvr>
-                                      <p:to>
-                                        <p:strVal val="visible"/>
-                                      </p:to>
-                                    </p:set>
-                                  </p:childTnLst>
-                                </p:cTn>
-                              </p:par>
-                            </p:childTnLst>
-                          </p:cTn>
-                        </p:par>
-                      </p:childTnLst>
-                    </p:cTn>
-                  </p:par>
-                </p:childTnLst>
-              </p:cTn>
-              <p:prevCondLst>
-                <p:cond evt="onPrev" delay="0">
-                  <p:tgtEl>
-                    <p:sldTgt/>
-                  </p:tgtEl>
-                </p:cond>
-              </p:prevCondLst>
-              <p:nextCondLst>
-                <p:cond evt="onNext" delay="0">
-                  <p:tgtEl>
-                    <p:sldTgt/>
-                  </p:tgtEl>
-                </p:cond>
-              </p:nextCondLst>
-            </p:seq>
-          </p:childTnLst>
-        </p:cTn>
-      </p:par>
-    </p:tnLst>
-  </p:timing>
 </p:sld>
 </file>
 
@@ -6726,7 +6684,7 @@
           <p:cNvPr id="2" name="Title 1">
             <a:extLst>
               <a:ext uri="{FF2B5EF4-FFF2-40B4-BE49-F238E27FC236}">
-                <a16:creationId xmlns:a16="http://schemas.microsoft.com/office/drawing/2014/main" id="{ABA02A26-848F-451D-BA54-8C5DDF8C0263}"/>
+                <a16:creationId xmlns:a16="http://schemas.microsoft.com/office/drawing/2014/main" id="{0EE4B5C6-8731-44C2-8095-209A952EBC05}"/>
               </a:ext>
             </a:extLst>
           </p:cNvPr>
@@ -6744,7 +6702,7 @@
           <a:p>
             <a:r>
               <a:rPr lang="en-US" dirty="0"/>
-              <a:t>The Python Model</a:t>
+              <a:t>Block Spring Model</a:t>
             </a:r>
           </a:p>
         </p:txBody>
@@ -6754,7 +6712,7 @@
           <p:cNvPr id="3" name="Content Placeholder 2">
             <a:extLst>
               <a:ext uri="{FF2B5EF4-FFF2-40B4-BE49-F238E27FC236}">
-                <a16:creationId xmlns:a16="http://schemas.microsoft.com/office/drawing/2014/main" id="{174039E4-837A-4C03-BABA-FB93ECBC01E7}"/>
+                <a16:creationId xmlns:a16="http://schemas.microsoft.com/office/drawing/2014/main" id="{C4E08536-744C-4772-99FD-3FE760409220}"/>
               </a:ext>
             </a:extLst>
           </p:cNvPr>
@@ -6765,60 +6723,85 @@
             <p:ph idx="1"/>
           </p:nvPr>
         </p:nvSpPr>
-        <p:spPr/>
+        <p:spPr>
+          <a:xfrm>
+            <a:off x="677334" y="1488613"/>
+            <a:ext cx="8596668" cy="3880773"/>
+          </a:xfrm>
+        </p:spPr>
         <p:txBody>
           <a:bodyPr/>
           <a:lstStyle/>
           <a:p>
             <a:r>
               <a:rPr lang="en-US" dirty="0"/>
-              <a:t>Overall motion function and friction function</a:t>
-            </a:r>
-          </a:p>
-          <a:p>
+              <a:t>Proposed by Burridge and </a:t>
+            </a:r>
+            <a:r>
+              <a:rPr lang="en-US" dirty="0" err="1"/>
+              <a:t>Knopoff</a:t>
+            </a:r>
             <a:r>
               <a:rPr lang="en-US" dirty="0"/>
-              <a:t>Used Euler method</a:t>
-            </a:r>
-          </a:p>
-          <a:p>
-            <a:pPr lvl="1"/>
+              <a:t> in 1967.</a:t>
+            </a:r>
+          </a:p>
+          <a:p>
             <a:r>
               <a:rPr lang="en-US" dirty="0"/>
-              <a:t>Adaptive step size</a:t>
-            </a:r>
-          </a:p>
-          <a:p>
-            <a:pPr lvl="1"/>
-            <a:r>
-              <a:rPr lang="en-US" dirty="0"/>
-              <a:t>Processes array at each timestep</a:t>
-            </a:r>
-          </a:p>
-          <a:p>
-            <a:r>
-              <a:rPr lang="en-US" dirty="0"/>
-              <a:t>Counted Earthquakes</a:t>
-            </a:r>
-          </a:p>
-          <a:p>
-            <a:r>
-              <a:rPr lang="en-US" dirty="0"/>
-              <a:t>Created logarithmic histogram</a:t>
-            </a:r>
-          </a:p>
-          <a:p>
-            <a:pPr marL="457200" lvl="1" indent="0">
-              <a:buNone/>
-            </a:pPr>
-            <a:endParaRPr lang="en-US" dirty="0"/>
-          </a:p>
-        </p:txBody>
-      </p:sp>
+              <a:t>Uses blocks to represent fault line from top view.</a:t>
+            </a:r>
+          </a:p>
+        </p:txBody>
+      </p:sp>
+      <p:pic>
+        <p:nvPicPr>
+          <p:cNvPr id="4" name="Picture 3">
+            <a:extLst>
+              <a:ext uri="{FF2B5EF4-FFF2-40B4-BE49-F238E27FC236}">
+                <a16:creationId xmlns:a16="http://schemas.microsoft.com/office/drawing/2014/main" id="{7963045C-FFB5-4FD7-B872-C90D4D6E221E}"/>
+              </a:ext>
+            </a:extLst>
+          </p:cNvPr>
+          <p:cNvPicPr>
+            <a:picLocks noChangeAspect="1"/>
+          </p:cNvPicPr>
+          <p:nvPr/>
+        </p:nvPicPr>
+        <p:blipFill>
+          <a:blip r:embed="rId2"/>
+          <a:stretch>
+            <a:fillRect/>
+          </a:stretch>
+        </p:blipFill>
+        <p:spPr>
+          <a:xfrm>
+            <a:off x="1357312" y="2654421"/>
+            <a:ext cx="9477375" cy="3212188"/>
+          </a:xfrm>
+          <a:prstGeom prst="rect">
+            <a:avLst/>
+          </a:prstGeom>
+        </p:spPr>
+        <p:style>
+          <a:lnRef idx="2">
+            <a:schemeClr val="accent1"/>
+          </a:lnRef>
+          <a:fillRef idx="1">
+            <a:schemeClr val="lt1"/>
+          </a:fillRef>
+          <a:effectRef idx="0">
+            <a:schemeClr val="accent1"/>
+          </a:effectRef>
+          <a:fontRef idx="minor">
+            <a:schemeClr val="dk1"/>
+          </a:fontRef>
+        </p:style>
+      </p:pic>
     </p:spTree>
     <p:extLst>
       <p:ext uri="{BB962C8B-B14F-4D97-AF65-F5344CB8AC3E}">
-        <p14:creationId xmlns:p14="http://schemas.microsoft.com/office/powerpoint/2010/main" val="2010906107"/>
+        <p14:creationId xmlns:p14="http://schemas.microsoft.com/office/powerpoint/2010/main" val="1379320804"/>
       </p:ext>
     </p:extLst>
   </p:cSld>
@@ -6850,7 +6833,7 @@
           <p:cNvPr id="2" name="Title 1">
             <a:extLst>
               <a:ext uri="{FF2B5EF4-FFF2-40B4-BE49-F238E27FC236}">
-                <a16:creationId xmlns:a16="http://schemas.microsoft.com/office/drawing/2014/main" id="{CBD3128C-F67F-4B28-B4D2-3BE13E67F7F2}"/>
+                <a16:creationId xmlns:a16="http://schemas.microsoft.com/office/drawing/2014/main" id="{61ED5AB8-FBD9-40DA-96E1-344417819D68}"/>
               </a:ext>
             </a:extLst>
           </p:cNvPr>
@@ -6868,52 +6851,57 @@
           <a:p>
             <a:r>
               <a:rPr lang="en-US" dirty="0"/>
-              <a:t>Small-Scale Results</a:t>
-            </a:r>
-          </a:p>
-        </p:txBody>
-      </p:sp>
-      <p:pic>
-        <p:nvPicPr>
-          <p:cNvPr id="5" name="Content Placeholder 4" descr="A screenshot of a cell phone&#10;&#10;Description generated with very high confidence">
+              <a:t>Friction Model</a:t>
+            </a:r>
+          </a:p>
+        </p:txBody>
+      </p:sp>
+      <p:sp>
+        <p:nvSpPr>
+          <p:cNvPr id="3" name="Content Placeholder 2">
             <a:extLst>
               <a:ext uri="{FF2B5EF4-FFF2-40B4-BE49-F238E27FC236}">
-                <a16:creationId xmlns:a16="http://schemas.microsoft.com/office/drawing/2014/main" id="{7DEC3E98-C4CD-4484-BBBB-7F1424B10CB7}"/>
+                <a16:creationId xmlns:a16="http://schemas.microsoft.com/office/drawing/2014/main" id="{279B0C5F-48D5-49EF-9547-710AAA1FF531}"/>
               </a:ext>
             </a:extLst>
           </p:cNvPr>
-          <p:cNvPicPr>
-            <a:picLocks noGrp="1" noChangeAspect="1"/>
-          </p:cNvPicPr>
+          <p:cNvSpPr>
+            <a:spLocks noGrp="1"/>
+          </p:cNvSpPr>
           <p:nvPr>
             <p:ph idx="1"/>
           </p:nvPr>
-        </p:nvPicPr>
-        <p:blipFill>
-          <a:blip r:embed="rId2">
-            <a:extLst>
-              <a:ext uri="{28A0092B-C50C-407E-A947-70E740481C1C}">
-                <a14:useLocalDpi xmlns:a14="http://schemas.microsoft.com/office/drawing/2010/main" val="0"/>
-              </a:ext>
-            </a:extLst>
-          </a:blip>
-          <a:stretch>
-            <a:fillRect/>
-          </a:stretch>
-        </p:blipFill>
-        <p:spPr>
-          <a:xfrm>
-            <a:off x="2120153" y="1331337"/>
-            <a:ext cx="7104530" cy="2622003"/>
-          </a:xfrm>
-        </p:spPr>
-      </p:pic>
+        </p:nvSpPr>
+        <p:spPr/>
+        <p:txBody>
+          <a:bodyPr/>
+          <a:lstStyle/>
+          <a:p>
+            <a:r>
+              <a:rPr lang="en-US" dirty="0"/>
+              <a:t>Stick-slip model</a:t>
+            </a:r>
+          </a:p>
+          <a:p>
+            <a:r>
+              <a:rPr lang="en-US" dirty="0"/>
+              <a:t>Friction decreases with velocity</a:t>
+            </a:r>
+          </a:p>
+          <a:p>
+            <a:r>
+              <a:rPr lang="en-US" dirty="0"/>
+              <a:t>There are other possible models</a:t>
+            </a:r>
+          </a:p>
+        </p:txBody>
+      </p:sp>
       <p:pic>
         <p:nvPicPr>
-          <p:cNvPr id="7" name="Picture 6" descr="A screenshot of a social media post&#10;&#10;Description generated with very high confidence">
+          <p:cNvPr id="4" name="Picture 3">
             <a:extLst>
               <a:ext uri="{FF2B5EF4-FFF2-40B4-BE49-F238E27FC236}">
-                <a16:creationId xmlns:a16="http://schemas.microsoft.com/office/drawing/2014/main" id="{005351E4-35E0-4DDC-9A03-A503808FBDD5}"/>
+                <a16:creationId xmlns:a16="http://schemas.microsoft.com/office/drawing/2014/main" id="{25C3052A-063A-4662-8CD6-09F919DF27F0}"/>
               </a:ext>
             </a:extLst>
           </p:cNvPr>
@@ -6922,32 +6910,39 @@
           </p:cNvPicPr>
           <p:nvPr/>
         </p:nvPicPr>
-        <p:blipFill>
-          <a:blip r:embed="rId3">
-            <a:extLst>
-              <a:ext uri="{28A0092B-C50C-407E-A947-70E740481C1C}">
-                <a14:useLocalDpi xmlns:a14="http://schemas.microsoft.com/office/drawing/2010/main" val="0"/>
-              </a:ext>
-            </a:extLst>
-          </a:blip>
-          <a:stretch>
-            <a:fillRect/>
-          </a:stretch>
+        <p:blipFill rotWithShape="1">
+          <a:blip r:embed="rId2"/>
+          <a:srcRect l="8161" t="3320" r="6710" b="1976"/>
+          <a:stretch/>
         </p:blipFill>
         <p:spPr>
           <a:xfrm>
-            <a:off x="2120153" y="3953341"/>
-            <a:ext cx="7104530" cy="2724118"/>
+            <a:off x="5422107" y="1400175"/>
+            <a:ext cx="4357687" cy="4343400"/>
           </a:xfrm>
           <a:prstGeom prst="rect">
             <a:avLst/>
           </a:prstGeom>
         </p:spPr>
+        <p:style>
+          <a:lnRef idx="2">
+            <a:schemeClr val="accent1"/>
+          </a:lnRef>
+          <a:fillRef idx="1">
+            <a:schemeClr val="lt1"/>
+          </a:fillRef>
+          <a:effectRef idx="0">
+            <a:schemeClr val="accent1"/>
+          </a:effectRef>
+          <a:fontRef idx="minor">
+            <a:schemeClr val="dk1"/>
+          </a:fontRef>
+        </p:style>
       </p:pic>
     </p:spTree>
     <p:extLst>
       <p:ext uri="{BB962C8B-B14F-4D97-AF65-F5344CB8AC3E}">
-        <p14:creationId xmlns:p14="http://schemas.microsoft.com/office/powerpoint/2010/main" val="500496359"/>
+        <p14:creationId xmlns:p14="http://schemas.microsoft.com/office/powerpoint/2010/main" val="2448793650"/>
       </p:ext>
     </p:extLst>
   </p:cSld>
@@ -6979,7 +6974,7 @@
           <p:cNvPr id="2" name="Title 1">
             <a:extLst>
               <a:ext uri="{FF2B5EF4-FFF2-40B4-BE49-F238E27FC236}">
-                <a16:creationId xmlns:a16="http://schemas.microsoft.com/office/drawing/2014/main" id="{7E88F9E4-BEB8-41BA-AE52-2EF84694111F}"/>
+                <a16:creationId xmlns:a16="http://schemas.microsoft.com/office/drawing/2014/main" id="{ABA02A26-848F-451D-BA54-8C5DDF8C0263}"/>
               </a:ext>
             </a:extLst>
           </p:cNvPr>
@@ -6997,26 +6992,71 @@
           <a:p>
             <a:r>
               <a:rPr lang="en-US" dirty="0"/>
-              <a:t>Small-Scale Earthquake Pattern</a:t>
+              <a:t>Python Model</a:t>
+            </a:r>
+          </a:p>
+        </p:txBody>
+      </p:sp>
+      <p:sp>
+        <p:nvSpPr>
+          <p:cNvPr id="3" name="Content Placeholder 2">
+            <a:extLst>
+              <a:ext uri="{FF2B5EF4-FFF2-40B4-BE49-F238E27FC236}">
+                <a16:creationId xmlns:a16="http://schemas.microsoft.com/office/drawing/2014/main" id="{174039E4-837A-4C03-BABA-FB93ECBC01E7}"/>
+              </a:ext>
+            </a:extLst>
+          </p:cNvPr>
+          <p:cNvSpPr>
+            <a:spLocks noGrp="1"/>
+          </p:cNvSpPr>
+          <p:nvPr>
+            <p:ph idx="1"/>
+          </p:nvPr>
+        </p:nvSpPr>
+        <p:spPr>
+          <a:xfrm>
+            <a:off x="677334" y="1282475"/>
+            <a:ext cx="8596668" cy="3880773"/>
+          </a:xfrm>
+        </p:spPr>
+        <p:txBody>
+          <a:bodyPr/>
+          <a:lstStyle/>
+          <a:p>
+            <a:r>
+              <a:rPr lang="en-US" dirty="0"/>
+              <a:t>Euler method</a:t>
+            </a:r>
+          </a:p>
+          <a:p>
+            <a:pPr lvl="1"/>
+            <a:r>
+              <a:rPr lang="en-US" dirty="0"/>
+              <a:t>Adaptive step size</a:t>
+            </a:r>
+          </a:p>
+          <a:p>
+            <a:pPr lvl="1"/>
+            <a:r>
+              <a:rPr lang="en-US" dirty="0"/>
+              <a:t>Calculates array of block positions and velocities at each timestep</a:t>
             </a:r>
           </a:p>
         </p:txBody>
       </p:sp>
       <p:pic>
         <p:nvPicPr>
-          <p:cNvPr id="5" name="Content Placeholder 4" descr="A picture containing indoor&#10;&#10;Description generated with high confidence">
+          <p:cNvPr id="6" name="Picture 5" descr="A picture containing laser&#10;&#10;Description generated with high confidence">
             <a:extLst>
               <a:ext uri="{FF2B5EF4-FFF2-40B4-BE49-F238E27FC236}">
-                <a16:creationId xmlns:a16="http://schemas.microsoft.com/office/drawing/2014/main" id="{ACC25CEE-6AE2-44A2-8B86-C91A02319D8C}"/>
+                <a16:creationId xmlns:a16="http://schemas.microsoft.com/office/drawing/2014/main" id="{E980EE3B-3635-4481-A8ED-ACD405EA89D3}"/>
               </a:ext>
             </a:extLst>
           </p:cNvPr>
           <p:cNvPicPr>
-            <a:picLocks noGrp="1" noChangeAspect="1"/>
+            <a:picLocks noChangeAspect="1"/>
           </p:cNvPicPr>
-          <p:nvPr>
-            <p:ph idx="1"/>
-          </p:nvPr>
+          <p:nvPr/>
         </p:nvPicPr>
         <p:blipFill>
           <a:blip r:embed="rId2">
@@ -7032,15 +7072,18 @@
         </p:blipFill>
         <p:spPr>
           <a:xfrm>
-            <a:off x="677863" y="2436103"/>
-            <a:ext cx="8596312" cy="3330407"/>
+            <a:off x="3127829" y="2675479"/>
+            <a:ext cx="4702628" cy="3675888"/>
           </a:xfrm>
+          <a:prstGeom prst="rect">
+            <a:avLst/>
+          </a:prstGeom>
         </p:spPr>
       </p:pic>
     </p:spTree>
     <p:extLst>
       <p:ext uri="{BB962C8B-B14F-4D97-AF65-F5344CB8AC3E}">
-        <p14:creationId xmlns:p14="http://schemas.microsoft.com/office/powerpoint/2010/main" val="3891265131"/>
+        <p14:creationId xmlns:p14="http://schemas.microsoft.com/office/powerpoint/2010/main" val="2010906107"/>
       </p:ext>
     </p:extLst>
   </p:cSld>
@@ -7072,7 +7115,7 @@
           <p:cNvPr id="2" name="Title 1">
             <a:extLst>
               <a:ext uri="{FF2B5EF4-FFF2-40B4-BE49-F238E27FC236}">
-                <a16:creationId xmlns:a16="http://schemas.microsoft.com/office/drawing/2014/main" id="{68B0A715-F160-4A04-990C-3F50B2D8BD1D}"/>
+                <a16:creationId xmlns:a16="http://schemas.microsoft.com/office/drawing/2014/main" id="{CBD3128C-F67F-4B28-B4D2-3BE13E67F7F2}"/>
               </a:ext>
             </a:extLst>
           </p:cNvPr>
@@ -7083,57 +7126,87 @@
             <p:ph type="title"/>
           </p:nvPr>
         </p:nvSpPr>
-        <p:spPr/>
+        <p:spPr>
+          <a:xfrm>
+            <a:off x="677334" y="130964"/>
+            <a:ext cx="8596668" cy="1320800"/>
+          </a:xfrm>
+        </p:spPr>
         <p:txBody>
           <a:bodyPr/>
           <a:lstStyle/>
           <a:p>
             <a:r>
               <a:rPr lang="en-US" dirty="0"/>
-              <a:t>Large-Scale Results</a:t>
+              <a:t>Results Over Short Time Period</a:t>
             </a:r>
           </a:p>
         </p:txBody>
       </p:sp>
       <p:pic>
         <p:nvPicPr>
-          <p:cNvPr id="5" name="Content Placeholder 4" descr="A close up of a map&#10;&#10;Description generated with very high confidence">
+          <p:cNvPr id="3" name="Picture 2">
             <a:extLst>
               <a:ext uri="{FF2B5EF4-FFF2-40B4-BE49-F238E27FC236}">
-                <a16:creationId xmlns:a16="http://schemas.microsoft.com/office/drawing/2014/main" id="{DDADCF6C-0D38-4A4E-94E5-D7A8B345545B}"/>
+                <a16:creationId xmlns:a16="http://schemas.microsoft.com/office/drawing/2014/main" id="{2C21F0F1-6A7C-4D92-A1AC-EC32D51D3843}"/>
               </a:ext>
             </a:extLst>
           </p:cNvPr>
           <p:cNvPicPr>
-            <a:picLocks noGrp="1" noChangeAspect="1"/>
+            <a:picLocks noChangeAspect="1"/>
           </p:cNvPicPr>
-          <p:nvPr>
-            <p:ph idx="1"/>
-          </p:nvPr>
+          <p:nvPr/>
         </p:nvPicPr>
         <p:blipFill>
-          <a:blip r:embed="rId2">
-            <a:extLst>
-              <a:ext uri="{28A0092B-C50C-407E-A947-70E740481C1C}">
-                <a14:useLocalDpi xmlns:a14="http://schemas.microsoft.com/office/drawing/2010/main" val="0"/>
-              </a:ext>
-            </a:extLst>
-          </a:blip>
+          <a:blip r:embed="rId2"/>
           <a:stretch>
             <a:fillRect/>
           </a:stretch>
         </p:blipFill>
         <p:spPr>
           <a:xfrm>
-            <a:off x="2181271" y="2160588"/>
-            <a:ext cx="5589496" cy="3881437"/>
+            <a:off x="1391388" y="726094"/>
+            <a:ext cx="7568834" cy="2901545"/>
           </a:xfrm>
+          <a:prstGeom prst="rect">
+            <a:avLst/>
+          </a:prstGeom>
+        </p:spPr>
+      </p:pic>
+      <p:pic>
+        <p:nvPicPr>
+          <p:cNvPr id="8" name="Picture 7">
+            <a:extLst>
+              <a:ext uri="{FF2B5EF4-FFF2-40B4-BE49-F238E27FC236}">
+                <a16:creationId xmlns:a16="http://schemas.microsoft.com/office/drawing/2014/main" id="{CB7BB5F7-961F-4AD7-985D-B404A4EF3A0C}"/>
+              </a:ext>
+            </a:extLst>
+          </p:cNvPr>
+          <p:cNvPicPr>
+            <a:picLocks noChangeAspect="1"/>
+          </p:cNvPicPr>
+          <p:nvPr/>
+        </p:nvPicPr>
+        <p:blipFill>
+          <a:blip r:embed="rId3"/>
+          <a:stretch>
+            <a:fillRect/>
+          </a:stretch>
+        </p:blipFill>
+        <p:spPr>
+          <a:xfrm>
+            <a:off x="1350247" y="3748914"/>
+            <a:ext cx="7767139" cy="2901545"/>
+          </a:xfrm>
+          <a:prstGeom prst="rect">
+            <a:avLst/>
+          </a:prstGeom>
         </p:spPr>
       </p:pic>
     </p:spTree>
     <p:extLst>
       <p:ext uri="{BB962C8B-B14F-4D97-AF65-F5344CB8AC3E}">
-        <p14:creationId xmlns:p14="http://schemas.microsoft.com/office/powerpoint/2010/main" val="3929200073"/>
+        <p14:creationId xmlns:p14="http://schemas.microsoft.com/office/powerpoint/2010/main" val="500496359"/>
       </p:ext>
     </p:extLst>
   </p:cSld>
@@ -7165,7 +7238,7 @@
           <p:cNvPr id="2" name="Title 1">
             <a:extLst>
               <a:ext uri="{FF2B5EF4-FFF2-40B4-BE49-F238E27FC236}">
-                <a16:creationId xmlns:a16="http://schemas.microsoft.com/office/drawing/2014/main" id="{320157D6-52E0-453F-8846-DFDDC0FFA4BF}"/>
+                <a16:creationId xmlns:a16="http://schemas.microsoft.com/office/drawing/2014/main" id="{7E88F9E4-BEB8-41BA-AE52-2EF84694111F}"/>
               </a:ext>
             </a:extLst>
           </p:cNvPr>
@@ -7183,17 +7256,57 @@
           <a:p>
             <a:r>
               <a:rPr lang="en-US" dirty="0"/>
-              <a:t>Varied Masses</a:t>
+              <a:t>Earthquake Pattern</a:t>
+            </a:r>
+          </a:p>
+        </p:txBody>
+      </p:sp>
+      <p:sp>
+        <p:nvSpPr>
+          <p:cNvPr id="4" name="Content Placeholder 3">
+            <a:extLst>
+              <a:ext uri="{FF2B5EF4-FFF2-40B4-BE49-F238E27FC236}">
+                <a16:creationId xmlns:a16="http://schemas.microsoft.com/office/drawing/2014/main" id="{7E8BB577-25D2-4233-92D4-AFD71A7D7A6D}"/>
+              </a:ext>
+            </a:extLst>
+          </p:cNvPr>
+          <p:cNvSpPr>
+            <a:spLocks noGrp="1"/>
+          </p:cNvSpPr>
+          <p:nvPr>
+            <p:ph sz="half" idx="2"/>
+          </p:nvPr>
+        </p:nvSpPr>
+        <p:spPr>
+          <a:xfrm>
+            <a:off x="677334" y="1453998"/>
+            <a:ext cx="8684380" cy="3304117"/>
+          </a:xfrm>
+        </p:spPr>
+        <p:txBody>
+          <a:bodyPr/>
+          <a:lstStyle/>
+          <a:p>
+            <a:r>
+              <a:rPr lang="en-US" dirty="0"/>
+              <a:t>Method of counting:</a:t>
+            </a:r>
+          </a:p>
+          <a:p>
+            <a:pPr lvl="1"/>
+            <a:r>
+              <a:rPr lang="en-US" dirty="0"/>
+              <a:t>Magnitude = logarithm of the sum of velocities of all the blocks over the time of the earthquake</a:t>
             </a:r>
           </a:p>
         </p:txBody>
       </p:sp>
       <p:pic>
         <p:nvPicPr>
-          <p:cNvPr id="5" name="Content Placeholder 4" descr="A close up of a map&#10;&#10;Description generated with very high confidence">
+          <p:cNvPr id="5" name="Content Placeholder 4" descr="A picture containing indoor&#10;&#10;Description generated with high confidence">
             <a:extLst>
               <a:ext uri="{FF2B5EF4-FFF2-40B4-BE49-F238E27FC236}">
-                <a16:creationId xmlns:a16="http://schemas.microsoft.com/office/drawing/2014/main" id="{C187E1B4-0CE9-4242-90D1-A28688387CA5}"/>
+                <a16:creationId xmlns:a16="http://schemas.microsoft.com/office/drawing/2014/main" id="{ACC25CEE-6AE2-44A2-8B86-C91A02319D8C}"/>
               </a:ext>
             </a:extLst>
           </p:cNvPr>
@@ -7201,7 +7314,7 @@
             <a:picLocks noGrp="1" noChangeAspect="1"/>
           </p:cNvPicPr>
           <p:nvPr>
-            <p:ph idx="1"/>
+            <p:ph idx="4294967295"/>
           </p:nvPr>
         </p:nvPicPr>
         <p:blipFill>
@@ -7218,15 +7331,29 @@
         </p:blipFill>
         <p:spPr>
           <a:xfrm>
-            <a:off x="2176477" y="2160588"/>
-            <a:ext cx="5599084" cy="3881437"/>
+            <a:off x="1227137" y="2657929"/>
+            <a:ext cx="9737725" cy="3771900"/>
           </a:xfrm>
         </p:spPr>
+        <p:style>
+          <a:lnRef idx="2">
+            <a:schemeClr val="accent1"/>
+          </a:lnRef>
+          <a:fillRef idx="1">
+            <a:schemeClr val="lt1"/>
+          </a:fillRef>
+          <a:effectRef idx="0">
+            <a:schemeClr val="accent1"/>
+          </a:effectRef>
+          <a:fontRef idx="minor">
+            <a:schemeClr val="dk1"/>
+          </a:fontRef>
+        </p:style>
       </p:pic>
     </p:spTree>
     <p:extLst>
       <p:ext uri="{BB962C8B-B14F-4D97-AF65-F5344CB8AC3E}">
-        <p14:creationId xmlns:p14="http://schemas.microsoft.com/office/powerpoint/2010/main" val="3891700054"/>
+        <p14:creationId xmlns:p14="http://schemas.microsoft.com/office/powerpoint/2010/main" val="3891265131"/>
       </p:ext>
     </p:extLst>
   </p:cSld>
@@ -7258,7 +7385,7 @@
           <p:cNvPr id="2" name="Title 1">
             <a:extLst>
               <a:ext uri="{FF2B5EF4-FFF2-40B4-BE49-F238E27FC236}">
-                <a16:creationId xmlns:a16="http://schemas.microsoft.com/office/drawing/2014/main" id="{505E8BDB-C898-4063-ABAD-B5DAD6A00DE7}"/>
+                <a16:creationId xmlns:a16="http://schemas.microsoft.com/office/drawing/2014/main" id="{68B0A715-F160-4A04-990C-3F50B2D8BD1D}"/>
               </a:ext>
             </a:extLst>
           </p:cNvPr>
@@ -7276,20 +7403,64 @@
           <a:p>
             <a:r>
               <a:rPr lang="en-US" dirty="0"/>
-              <a:t>Conclusion</a:t>
-            </a:r>
-          </a:p>
-        </p:txBody>
-      </p:sp>
-      <p:sp>
-        <p:nvSpPr>
-          <p:cNvPr id="3" name="Content Placeholder 2">
+              <a:t>Results Over Large Time Period</a:t>
+            </a:r>
+          </a:p>
+        </p:txBody>
+      </p:sp>
+      <p:pic>
+        <p:nvPicPr>
+          <p:cNvPr id="3" name="Picture 2">
             <a:extLst>
               <a:ext uri="{FF2B5EF4-FFF2-40B4-BE49-F238E27FC236}">
-                <a16:creationId xmlns:a16="http://schemas.microsoft.com/office/drawing/2014/main" id="{C4709CF8-0D5D-4626-9097-95BD4675B51D}"/>
+                <a16:creationId xmlns:a16="http://schemas.microsoft.com/office/drawing/2014/main" id="{850E8F01-4194-4581-ACF5-FD365DED3732}"/>
               </a:ext>
             </a:extLst>
           </p:cNvPr>
+          <p:cNvPicPr>
+            <a:picLocks noChangeAspect="1"/>
+          </p:cNvPicPr>
+          <p:nvPr/>
+        </p:nvPicPr>
+        <p:blipFill>
+          <a:blip r:embed="rId2"/>
+          <a:stretch>
+            <a:fillRect/>
+          </a:stretch>
+        </p:blipFill>
+        <p:spPr>
+          <a:xfrm>
+            <a:off x="549236" y="2622551"/>
+            <a:ext cx="10472424" cy="3880772"/>
+          </a:xfrm>
+          <a:prstGeom prst="rect">
+            <a:avLst/>
+          </a:prstGeom>
+        </p:spPr>
+        <p:style>
+          <a:lnRef idx="2">
+            <a:schemeClr val="accent1"/>
+          </a:lnRef>
+          <a:fillRef idx="1">
+            <a:schemeClr val="lt1"/>
+          </a:fillRef>
+          <a:effectRef idx="0">
+            <a:schemeClr val="accent1"/>
+          </a:effectRef>
+          <a:fontRef idx="minor">
+            <a:schemeClr val="dk1"/>
+          </a:fontRef>
+        </p:style>
+      </p:pic>
+      <p:sp>
+        <p:nvSpPr>
+          <p:cNvPr id="6" name="Content Placeholder 5">
+            <a:extLst>
+              <a:ext uri="{FF2B5EF4-FFF2-40B4-BE49-F238E27FC236}">
+                <a16:creationId xmlns:a16="http://schemas.microsoft.com/office/drawing/2014/main" id="{7F9AB24E-05EB-4C08-BA1C-A1E9F21EF935}"/>
+              </a:ext>
+            </a:extLst>
+          </p:cNvPr>
           <p:cNvSpPr>
             <a:spLocks noGrp="1"/>
           </p:cNvSpPr>
@@ -7297,27 +7468,31 @@
             <p:ph idx="1"/>
           </p:nvPr>
         </p:nvSpPr>
-        <p:spPr/>
+        <p:spPr>
+          <a:xfrm>
+            <a:off x="677334" y="1301751"/>
+            <a:ext cx="8596668" cy="3880773"/>
+          </a:xfrm>
+        </p:spPr>
         <p:txBody>
           <a:bodyPr/>
           <a:lstStyle/>
           <a:p>
             <a:r>
               <a:rPr lang="en-US" dirty="0"/>
-              <a:t>Model accurate for small magnitudes</a:t>
+              <a:t>Decaying exponential within magnitude range -3 to 0</a:t>
             </a:r>
           </a:p>
           <a:p>
             <a:r>
               <a:rPr lang="en-US" dirty="0"/>
-              <a:t>Evidence of periodic self-organized criticality</a:t>
-            </a:r>
-          </a:p>
-          <a:p>
-            <a:pPr lvl="1"/>
+              <a:t>Excess of large earthquakes</a:t>
+            </a:r>
+          </a:p>
+          <a:p>
             <a:r>
               <a:rPr lang="en-US" dirty="0"/>
-              <a:t>May help us predict when earthquakes will occur</a:t>
+              <a:t>b = 0.825</a:t>
             </a:r>
           </a:p>
         </p:txBody>
@@ -7325,7 +7500,7 @@
     </p:spTree>
     <p:extLst>
       <p:ext uri="{BB962C8B-B14F-4D97-AF65-F5344CB8AC3E}">
-        <p14:creationId xmlns:p14="http://schemas.microsoft.com/office/powerpoint/2010/main" val="3295934818"/>
+        <p14:creationId xmlns:p14="http://schemas.microsoft.com/office/powerpoint/2010/main" val="3929200073"/>
       </p:ext>
     </p:extLst>
   </p:cSld>

</xml_diff>

<commit_message>
Add image and make small writing changes
</commit_message>
<xml_diff>
--- a/Earthquake Presentation.pptx
+++ b/Earthquake Presentation.pptx
@@ -845,7 +845,7 @@
           <a:p>
             <a:fld id="{968651FB-3A31-47DC-940D-9D9C74EBAE1B}" type="datetimeFigureOut">
               <a:rPr lang="en-US" smtClean="0"/>
-              <a:t>5/13/2018</a:t>
+              <a:t>5/14/2018</a:t>
             </a:fld>
             <a:endParaRPr lang="en-US"/>
           </a:p>
@@ -1096,7 +1096,7 @@
           <a:p>
             <a:fld id="{968651FB-3A31-47DC-940D-9D9C74EBAE1B}" type="datetimeFigureOut">
               <a:rPr lang="en-US" smtClean="0"/>
-              <a:t>5/13/2018</a:t>
+              <a:t>5/14/2018</a:t>
             </a:fld>
             <a:endParaRPr lang="en-US"/>
           </a:p>
@@ -1410,7 +1410,7 @@
           <a:p>
             <a:fld id="{968651FB-3A31-47DC-940D-9D9C74EBAE1B}" type="datetimeFigureOut">
               <a:rPr lang="en-US" smtClean="0"/>
-              <a:t>5/13/2018</a:t>
+              <a:t>5/14/2018</a:t>
             </a:fld>
             <a:endParaRPr lang="en-US"/>
           </a:p>
@@ -1751,7 +1751,7 @@
           <a:p>
             <a:fld id="{968651FB-3A31-47DC-940D-9D9C74EBAE1B}" type="datetimeFigureOut">
               <a:rPr lang="en-US" smtClean="0"/>
-              <a:t>5/13/2018</a:t>
+              <a:t>5/14/2018</a:t>
             </a:fld>
             <a:endParaRPr lang="en-US"/>
           </a:p>
@@ -2065,7 +2065,7 @@
           <a:p>
             <a:fld id="{968651FB-3A31-47DC-940D-9D9C74EBAE1B}" type="datetimeFigureOut">
               <a:rPr lang="en-US" smtClean="0"/>
-              <a:t>5/13/2018</a:t>
+              <a:t>5/14/2018</a:t>
             </a:fld>
             <a:endParaRPr lang="en-US"/>
           </a:p>
@@ -2458,7 +2458,7 @@
           <a:p>
             <a:fld id="{968651FB-3A31-47DC-940D-9D9C74EBAE1B}" type="datetimeFigureOut">
               <a:rPr lang="en-US" smtClean="0"/>
-              <a:t>5/13/2018</a:t>
+              <a:t>5/14/2018</a:t>
             </a:fld>
             <a:endParaRPr lang="en-US"/>
           </a:p>
@@ -2628,7 +2628,7 @@
           <a:p>
             <a:fld id="{968651FB-3A31-47DC-940D-9D9C74EBAE1B}" type="datetimeFigureOut">
               <a:rPr lang="en-US" smtClean="0"/>
-              <a:t>5/13/2018</a:t>
+              <a:t>5/14/2018</a:t>
             </a:fld>
             <a:endParaRPr lang="en-US"/>
           </a:p>
@@ -2808,7 +2808,7 @@
           <a:p>
             <a:fld id="{968651FB-3A31-47DC-940D-9D9C74EBAE1B}" type="datetimeFigureOut">
               <a:rPr lang="en-US" smtClean="0"/>
-              <a:t>5/13/2018</a:t>
+              <a:t>5/14/2018</a:t>
             </a:fld>
             <a:endParaRPr lang="en-US"/>
           </a:p>
@@ -2984,7 +2984,7 @@
           <a:p>
             <a:fld id="{968651FB-3A31-47DC-940D-9D9C74EBAE1B}" type="datetimeFigureOut">
               <a:rPr lang="en-US" smtClean="0"/>
-              <a:t>5/13/2018</a:t>
+              <a:t>5/14/2018</a:t>
             </a:fld>
             <a:endParaRPr lang="en-US"/>
           </a:p>
@@ -3231,7 +3231,7 @@
           <a:p>
             <a:fld id="{968651FB-3A31-47DC-940D-9D9C74EBAE1B}" type="datetimeFigureOut">
               <a:rPr lang="en-US" smtClean="0"/>
-              <a:t>5/13/2018</a:t>
+              <a:t>5/14/2018</a:t>
             </a:fld>
             <a:endParaRPr lang="en-US"/>
           </a:p>
@@ -3463,7 +3463,7 @@
           <a:p>
             <a:fld id="{968651FB-3A31-47DC-940D-9D9C74EBAE1B}" type="datetimeFigureOut">
               <a:rPr lang="en-US" smtClean="0"/>
-              <a:t>5/13/2018</a:t>
+              <a:t>5/14/2018</a:t>
             </a:fld>
             <a:endParaRPr lang="en-US"/>
           </a:p>
@@ -3837,7 +3837,7 @@
           <a:p>
             <a:fld id="{968651FB-3A31-47DC-940D-9D9C74EBAE1B}" type="datetimeFigureOut">
               <a:rPr lang="en-US" smtClean="0"/>
-              <a:t>5/13/2018</a:t>
+              <a:t>5/14/2018</a:t>
             </a:fld>
             <a:endParaRPr lang="en-US"/>
           </a:p>
@@ -3960,7 +3960,7 @@
           <a:p>
             <a:fld id="{968651FB-3A31-47DC-940D-9D9C74EBAE1B}" type="datetimeFigureOut">
               <a:rPr lang="en-US" smtClean="0"/>
-              <a:t>5/13/2018</a:t>
+              <a:t>5/14/2018</a:t>
             </a:fld>
             <a:endParaRPr lang="en-US"/>
           </a:p>
@@ -4055,7 +4055,7 @@
           <a:p>
             <a:fld id="{968651FB-3A31-47DC-940D-9D9C74EBAE1B}" type="datetimeFigureOut">
               <a:rPr lang="en-US" smtClean="0"/>
-              <a:t>5/13/2018</a:t>
+              <a:t>5/14/2018</a:t>
             </a:fld>
             <a:endParaRPr lang="en-US"/>
           </a:p>
@@ -4310,7 +4310,7 @@
           <a:p>
             <a:fld id="{968651FB-3A31-47DC-940D-9D9C74EBAE1B}" type="datetimeFigureOut">
               <a:rPr lang="en-US" smtClean="0"/>
-              <a:t>5/13/2018</a:t>
+              <a:t>5/14/2018</a:t>
             </a:fld>
             <a:endParaRPr lang="en-US"/>
           </a:p>
@@ -4573,7 +4573,7 @@
           <a:p>
             <a:fld id="{968651FB-3A31-47DC-940D-9D9C74EBAE1B}" type="datetimeFigureOut">
               <a:rPr lang="en-US" smtClean="0"/>
-              <a:t>5/13/2018</a:t>
+              <a:t>5/14/2018</a:t>
             </a:fld>
             <a:endParaRPr lang="en-US"/>
           </a:p>
@@ -5316,7 +5316,7 @@
           <a:p>
             <a:fld id="{968651FB-3A31-47DC-940D-9D9C74EBAE1B}" type="datetimeFigureOut">
               <a:rPr lang="en-US" smtClean="0"/>
-              <a:t>5/13/2018</a:t>
+              <a:t>5/14/2018</a:t>
             </a:fld>
             <a:endParaRPr lang="en-US"/>
           </a:p>

</xml_diff>

<commit_message>
Add labels to equations
</commit_message>
<xml_diff>
--- a/Earthquake Presentation.pptx
+++ b/Earthquake Presentation.pptx
@@ -6227,12 +6227,12 @@
         <p:spPr>
           <a:xfrm>
             <a:off x="677334" y="1349829"/>
-            <a:ext cx="8596668" cy="4691533"/>
+            <a:ext cx="8596668" cy="4898571"/>
           </a:xfrm>
         </p:spPr>
         <p:txBody>
           <a:bodyPr>
-            <a:normAutofit fontScale="92500" lnSpcReduction="20000"/>
+            <a:normAutofit fontScale="85000" lnSpcReduction="20000"/>
           </a:bodyPr>
           <a:lstStyle/>
           <a:p>
@@ -6364,7 +6364,19 @@
             </a:r>
             <a:r>
               <a:rPr lang="en-US" dirty="0"/>
-              <a:t>: 10.1038/srep35831 (2016). </a:t>
+              <a:t>: 10.1038/srep35831 (2016).</a:t>
+            </a:r>
+          </a:p>
+          <a:p>
+            <a:r>
+              <a:rPr lang="en-US" dirty="0"/>
+              <a:t>[7] "Plate Tectonics." Bucknell University, 2017.</a:t>
+            </a:r>
+          </a:p>
+          <a:p>
+            <a:r>
+              <a:rPr lang="en-US" dirty="0"/>
+              <a:t>[8] “Seismicity and Earthquake Hazard in the UK.” Seismicity And Earthquake Hazard In The UK, National Environment Research Council, 2018. </a:t>
             </a:r>
           </a:p>
           <a:p>

</xml_diff>